<commit_message>
Changing the master template for SSBCSJ bhajans
</commit_message>
<xml_diff>
--- a/WebContent/WEB-INF/master.pptx
+++ b/WebContent/WEB-INF/master.pptx
@@ -289,7 +289,7 @@
             <a:fld id="{1D8BD707-D9CF-40AE-B4C6-C98DA3205C09}" type="datetimeFigureOut">
               <a:rPr lang="en-US" smtClean="0"/>
               <a:pPr/>
-              <a:t>4/13/15</a:t>
+              <a:t>06/12/15</a:t>
             </a:fld>
             <a:endParaRPr lang="en-US"/>
           </a:p>
@@ -456,7 +456,7 @@
             <a:fld id="{1D8BD707-D9CF-40AE-B4C6-C98DA3205C09}" type="datetimeFigureOut">
               <a:rPr lang="en-US" smtClean="0"/>
               <a:pPr/>
-              <a:t>4/13/15</a:t>
+              <a:t>06/12/15</a:t>
             </a:fld>
             <a:endParaRPr lang="en-US"/>
           </a:p>
@@ -633,7 +633,7 @@
             <a:fld id="{1D8BD707-D9CF-40AE-B4C6-C98DA3205C09}" type="datetimeFigureOut">
               <a:rPr lang="en-US" smtClean="0"/>
               <a:pPr/>
-              <a:t>4/13/15</a:t>
+              <a:t>06/12/15</a:t>
             </a:fld>
             <a:endParaRPr lang="en-US"/>
           </a:p>
@@ -800,7 +800,7 @@
             <a:fld id="{1D8BD707-D9CF-40AE-B4C6-C98DA3205C09}" type="datetimeFigureOut">
               <a:rPr lang="en-US" smtClean="0"/>
               <a:pPr/>
-              <a:t>4/13/15</a:t>
+              <a:t>06/12/15</a:t>
             </a:fld>
             <a:endParaRPr lang="en-US"/>
           </a:p>
@@ -1043,7 +1043,7 @@
             <a:fld id="{1D8BD707-D9CF-40AE-B4C6-C98DA3205C09}" type="datetimeFigureOut">
               <a:rPr lang="en-US" smtClean="0"/>
               <a:pPr/>
-              <a:t>4/13/15</a:t>
+              <a:t>06/12/15</a:t>
             </a:fld>
             <a:endParaRPr lang="en-US"/>
           </a:p>
@@ -1328,7 +1328,7 @@
             <a:fld id="{1D8BD707-D9CF-40AE-B4C6-C98DA3205C09}" type="datetimeFigureOut">
               <a:rPr lang="en-US" smtClean="0"/>
               <a:pPr/>
-              <a:t>4/13/15</a:t>
+              <a:t>06/12/15</a:t>
             </a:fld>
             <a:endParaRPr lang="en-US"/>
           </a:p>
@@ -1747,7 +1747,7 @@
             <a:fld id="{1D8BD707-D9CF-40AE-B4C6-C98DA3205C09}" type="datetimeFigureOut">
               <a:rPr lang="en-US" smtClean="0"/>
               <a:pPr/>
-              <a:t>4/13/15</a:t>
+              <a:t>06/12/15</a:t>
             </a:fld>
             <a:endParaRPr lang="en-US"/>
           </a:p>
@@ -1862,7 +1862,7 @@
             <a:fld id="{1D8BD707-D9CF-40AE-B4C6-C98DA3205C09}" type="datetimeFigureOut">
               <a:rPr lang="en-US" smtClean="0"/>
               <a:pPr/>
-              <a:t>4/13/15</a:t>
+              <a:t>06/12/15</a:t>
             </a:fld>
             <a:endParaRPr lang="en-US"/>
           </a:p>
@@ -1954,7 +1954,7 @@
             <a:fld id="{1D8BD707-D9CF-40AE-B4C6-C98DA3205C09}" type="datetimeFigureOut">
               <a:rPr lang="en-US" smtClean="0"/>
               <a:pPr/>
-              <a:t>4/13/15</a:t>
+              <a:t>06/12/15</a:t>
             </a:fld>
             <a:endParaRPr lang="en-US"/>
           </a:p>
@@ -2228,7 +2228,7 @@
             <a:fld id="{1D8BD707-D9CF-40AE-B4C6-C98DA3205C09}" type="datetimeFigureOut">
               <a:rPr lang="en-US" smtClean="0"/>
               <a:pPr/>
-              <a:t>4/13/15</a:t>
+              <a:t>06/12/15</a:t>
             </a:fld>
             <a:endParaRPr lang="en-US"/>
           </a:p>
@@ -2478,7 +2478,7 @@
             <a:fld id="{1D8BD707-D9CF-40AE-B4C6-C98DA3205C09}" type="datetimeFigureOut">
               <a:rPr lang="en-US" smtClean="0"/>
               <a:pPr/>
-              <a:t>4/13/15</a:t>
+              <a:t>06/12/15</a:t>
             </a:fld>
             <a:endParaRPr lang="en-US"/>
           </a:p>
@@ -2688,7 +2688,7 @@
             <a:fld id="{1D8BD707-D9CF-40AE-B4C6-C98DA3205C09}" type="datetimeFigureOut">
               <a:rPr lang="en-US" smtClean="0"/>
               <a:pPr/>
-              <a:t>4/13/15</a:t>
+              <a:t>06/12/15</a:t>
             </a:fld>
             <a:endParaRPr lang="en-US"/>
           </a:p>
@@ -3045,6 +3045,14 @@
 <file path=ppt/slides/slide1.xml><?xml version="1.0" encoding="utf-8"?>
 <p:sld xmlns:a="http://schemas.openxmlformats.org/drawingml/2006/main" xmlns:r="http://schemas.openxmlformats.org/officeDocument/2006/relationships" xmlns:p="http://schemas.openxmlformats.org/presentationml/2006/main">
   <p:cSld>
+    <p:bg>
+      <p:bgPr>
+        <a:solidFill>
+          <a:schemeClr val="tx1"/>
+        </a:solidFill>
+        <a:effectLst/>
+      </p:bgPr>
+    </p:bg>
     <p:spTree>
       <p:nvGrpSpPr>
         <p:cNvPr id="1" name=""/>
@@ -3086,7 +3094,7 @@
             <a:r>
               <a:rPr lang="en-US" sz="3200" b="1" i="0" dirty="0" err="1" smtClean="0">
                 <a:solidFill>
-                  <a:srgbClr val="000000"/>
+                  <a:schemeClr val="bg1"/>
                 </a:solidFill>
                 <a:latin typeface="Calibri"/>
               </a:rPr>
@@ -3094,7 +3102,7 @@
             </a:r>
             <a:endParaRPr lang="en-US" sz="3200" b="1" i="0" dirty="0">
               <a:solidFill>
-                <a:srgbClr val="000000"/>
+                <a:schemeClr val="bg1"/>
               </a:solidFill>
               <a:latin typeface="Calibri"/>
             </a:endParaRPr>
@@ -3126,23 +3134,21 @@
               </a:lnSpc>
             </a:pPr>
             <a:r>
-              <a:rPr lang="en-US" sz="2400" b="1" i="0" dirty="0" err="1" smtClean="0">
+              <a:rPr lang="en-US" sz="2200" b="1" i="1" dirty="0" err="1" smtClean="0">
                 <a:solidFill>
-                  <a:schemeClr val="accent1">
-                    <a:lumMod val="75000"/>
-                  </a:schemeClr>
+                  <a:srgbClr val="FFFFFF"/>
                 </a:solidFill>
-                <a:latin typeface="+mj-lt"/>
+                <a:latin typeface="Times"/>
+                <a:cs typeface="Times"/>
               </a:rPr>
               <a:t>EnglishBhajanMeaning</a:t>
             </a:r>
-            <a:endParaRPr lang="en-US" sz="2400" b="1" i="0" dirty="0">
+            <a:endParaRPr lang="en-US" sz="2200" b="1" i="1" dirty="0">
               <a:solidFill>
-                <a:schemeClr val="accent1">
-                  <a:lumMod val="75000"/>
-                </a:schemeClr>
+                <a:srgbClr val="FFFFFF"/>
               </a:solidFill>
-              <a:latin typeface="+mj-lt"/>
+              <a:latin typeface="Times"/>
+              <a:cs typeface="Times"/>
             </a:endParaRPr>
           </a:p>
         </p:txBody>
@@ -3174,7 +3180,7 @@
             <a:r>
               <a:rPr lang="en-US" sz="2000" b="1" i="0" dirty="0" err="1" smtClean="0">
                 <a:solidFill>
-                  <a:srgbClr val="FF0000"/>
+                  <a:srgbClr val="FFFF00"/>
                 </a:solidFill>
                 <a:latin typeface="Arial"/>
               </a:rPr>
@@ -3182,7 +3188,7 @@
             </a:r>
             <a:endParaRPr lang="en-US" sz="2000" b="1" i="0" dirty="0">
               <a:solidFill>
-                <a:srgbClr val="FF0000"/>
+                <a:srgbClr val="FFFF00"/>
               </a:solidFill>
               <a:latin typeface="Arial"/>
             </a:endParaRPr>
@@ -3216,7 +3222,7 @@
             <a:r>
               <a:rPr lang="en-US" sz="2000" b="1" i="0" dirty="0" err="1" smtClean="0">
                 <a:solidFill>
-                  <a:srgbClr val="FF0000"/>
+                  <a:srgbClr val="FFFF00"/>
                 </a:solidFill>
                 <a:latin typeface="Arial"/>
               </a:rPr>
@@ -3224,7 +3230,7 @@
             </a:r>
             <a:endParaRPr lang="en-US" sz="2000" b="1" i="0" dirty="0">
               <a:solidFill>
-                <a:srgbClr val="FF0000"/>
+                <a:srgbClr val="FFFF00"/>
               </a:solidFill>
               <a:latin typeface="Arial"/>
             </a:endParaRPr>
@@ -3258,7 +3264,7 @@
             <a:r>
               <a:rPr lang="en-US" sz="2000" b="1" i="0" dirty="0" err="1" smtClean="0">
                 <a:solidFill>
-                  <a:srgbClr val="FF0000"/>
+                  <a:srgbClr val="FFFF00"/>
                 </a:solidFill>
                 <a:latin typeface="Arial"/>
               </a:rPr>
@@ -3266,7 +3272,7 @@
             </a:r>
             <a:endParaRPr lang="en-US" sz="2000" b="1" i="0" dirty="0">
               <a:solidFill>
-                <a:srgbClr val="FF0000"/>
+                <a:srgbClr val="FFFF00"/>
               </a:solidFill>
               <a:latin typeface="Arial"/>
             </a:endParaRPr>

</xml_diff>

<commit_message>
Updating slide master again
</commit_message>
<xml_diff>
--- a/WebContent/WEB-INF/master.pptx
+++ b/WebContent/WEB-INF/master.pptx
@@ -2539,9 +2539,12 @@
 <p:sldMaster xmlns:a="http://schemas.openxmlformats.org/drawingml/2006/main" xmlns:r="http://schemas.openxmlformats.org/officeDocument/2006/relationships" xmlns:p="http://schemas.openxmlformats.org/presentationml/2006/main">
   <p:cSld>
     <p:bg>
-      <p:bgRef idx="1001">
-        <a:schemeClr val="bg1"/>
-      </p:bgRef>
+      <p:bgPr>
+        <a:solidFill>
+          <a:schemeClr val="tx1"/>
+        </a:solidFill>
+        <a:effectLst/>
+      </p:bgPr>
     </p:bg>
     <p:spTree>
       <p:nvGrpSpPr>
@@ -3045,14 +3048,6 @@
 <file path=ppt/slides/slide1.xml><?xml version="1.0" encoding="utf-8"?>
 <p:sld xmlns:a="http://schemas.openxmlformats.org/drawingml/2006/main" xmlns:r="http://schemas.openxmlformats.org/officeDocument/2006/relationships" xmlns:p="http://schemas.openxmlformats.org/presentationml/2006/main">
   <p:cSld>
-    <p:bg>
-      <p:bgPr>
-        <a:solidFill>
-          <a:schemeClr val="tx1"/>
-        </a:solidFill>
-        <a:effectLst/>
-      </p:bgPr>
-    </p:bg>
     <p:spTree>
       <p:nvGrpSpPr>
         <p:cNvPr id="1" name=""/>

</xml_diff>